<commit_message>
Revert "Merge remote-tracking branch 'upstream/main' into prepcards"
This reverts commit 07484bbb798f382fc9684058f35bef0e7d1917e5, reversing
changes made to 169d0feedfb0363f2cb95d05c40839c18e596f09.
</commit_message>
<xml_diff>
--- a/docpac_feb25/WeeklyReview.pptx
+++ b/docpac_feb25/WeeklyReview.pptx
@@ -176,7 +176,7 @@
   <pc:docChgLst>
     <pc:chgData name="Christopher Smith" userId="dd7fc2d5-9988-40ef-9498-c94fd49fd9a4" providerId="ADAL" clId="{C276C02F-050A-4F17-94C1-E5D14F895005}"/>
     <pc:docChg chg="custSel addSld delSld modSld">
-      <pc:chgData name="Christopher Smith" userId="dd7fc2d5-9988-40ef-9498-c94fd49fd9a4" providerId="ADAL" clId="{C276C02F-050A-4F17-94C1-E5D14F895005}" dt="2022-02-22T13:20:38.303" v="3194"/>
+      <pc:chgData name="Christopher Smith" userId="dd7fc2d5-9988-40ef-9498-c94fd49fd9a4" providerId="ADAL" clId="{C276C02F-050A-4F17-94C1-E5D14F895005}" dt="2022-02-22T13:09:39.622" v="3186" actId="400"/>
       <pc:docMkLst>
         <pc:docMk/>
       </pc:docMkLst>
@@ -187,8 +187,8 @@
           <pc:sldMk cId="502978060" sldId="257"/>
         </pc:sldMkLst>
       </pc:sldChg>
-      <pc:sldChg chg="modSp add modAnim">
-        <pc:chgData name="Christopher Smith" userId="dd7fc2d5-9988-40ef-9498-c94fd49fd9a4" providerId="ADAL" clId="{C276C02F-050A-4F17-94C1-E5D14F895005}" dt="2022-02-22T13:20:23.328" v="3187"/>
+      <pc:sldChg chg="modSp add">
+        <pc:chgData name="Christopher Smith" userId="dd7fc2d5-9988-40ef-9498-c94fd49fd9a4" providerId="ADAL" clId="{C276C02F-050A-4F17-94C1-E5D14F895005}" dt="2022-02-22T12:45:22.849" v="634" actId="20577"/>
         <pc:sldMkLst>
           <pc:docMk/>
           <pc:sldMk cId="2507572621" sldId="257"/>
@@ -210,8 +210,8 @@
           </ac:spMkLst>
         </pc:spChg>
       </pc:sldChg>
-      <pc:sldChg chg="modSp add modAnim">
-        <pc:chgData name="Christopher Smith" userId="dd7fc2d5-9988-40ef-9498-c94fd49fd9a4" providerId="ADAL" clId="{C276C02F-050A-4F17-94C1-E5D14F895005}" dt="2022-02-22T13:20:33.913" v="3192"/>
+      <pc:sldChg chg="modSp add">
+        <pc:chgData name="Christopher Smith" userId="dd7fc2d5-9988-40ef-9498-c94fd49fd9a4" providerId="ADAL" clId="{C276C02F-050A-4F17-94C1-E5D14F895005}" dt="2022-02-22T12:45:50.618" v="679" actId="403"/>
         <pc:sldMkLst>
           <pc:docMk/>
           <pc:sldMk cId="1424444010" sldId="258"/>
@@ -240,8 +240,8 @@
           <pc:sldMk cId="1720946084" sldId="258"/>
         </pc:sldMkLst>
       </pc:sldChg>
-      <pc:sldChg chg="modSp add modAnim">
-        <pc:chgData name="Christopher Smith" userId="dd7fc2d5-9988-40ef-9498-c94fd49fd9a4" providerId="ADAL" clId="{C276C02F-050A-4F17-94C1-E5D14F895005}" dt="2022-02-22T13:20:25.786" v="3188"/>
+      <pc:sldChg chg="modSp add">
+        <pc:chgData name="Christopher Smith" userId="dd7fc2d5-9988-40ef-9498-c94fd49fd9a4" providerId="ADAL" clId="{C276C02F-050A-4F17-94C1-E5D14F895005}" dt="2022-02-22T12:48:39.966" v="1103" actId="20577"/>
         <pc:sldMkLst>
           <pc:docMk/>
           <pc:sldMk cId="1215748744" sldId="259"/>
@@ -277,8 +277,8 @@
           <pc:sldMk cId="1711072872" sldId="260"/>
         </pc:sldMkLst>
       </pc:sldChg>
-      <pc:sldChg chg="modSp add modAnim">
-        <pc:chgData name="Christopher Smith" userId="dd7fc2d5-9988-40ef-9498-c94fd49fd9a4" providerId="ADAL" clId="{C276C02F-050A-4F17-94C1-E5D14F895005}" dt="2022-02-22T13:20:31.904" v="3191"/>
+      <pc:sldChg chg="modSp add">
+        <pc:chgData name="Christopher Smith" userId="dd7fc2d5-9988-40ef-9498-c94fd49fd9a4" providerId="ADAL" clId="{C276C02F-050A-4F17-94C1-E5D14F895005}" dt="2022-02-22T13:03:21.473" v="2372" actId="20577"/>
         <pc:sldMkLst>
           <pc:docMk/>
           <pc:sldMk cId="3057571475" sldId="260"/>
@@ -300,8 +300,8 @@
           </ac:spMkLst>
         </pc:spChg>
       </pc:sldChg>
-      <pc:sldChg chg="modSp add modAnim">
-        <pc:chgData name="Christopher Smith" userId="dd7fc2d5-9988-40ef-9498-c94fd49fd9a4" providerId="ADAL" clId="{C276C02F-050A-4F17-94C1-E5D14F895005}" dt="2022-02-22T13:20:27.555" v="3189"/>
+      <pc:sldChg chg="modSp add">
+        <pc:chgData name="Christopher Smith" userId="dd7fc2d5-9988-40ef-9498-c94fd49fd9a4" providerId="ADAL" clId="{C276C02F-050A-4F17-94C1-E5D14F895005}" dt="2022-02-22T12:58:41.093" v="1696" actId="20577"/>
         <pc:sldMkLst>
           <pc:docMk/>
           <pc:sldMk cId="1700104824" sldId="261"/>
@@ -337,8 +337,8 @@
           <pc:sldMk cId="167472778" sldId="262"/>
         </pc:sldMkLst>
       </pc:sldChg>
-      <pc:sldChg chg="modSp add modAnim">
-        <pc:chgData name="Christopher Smith" userId="dd7fc2d5-9988-40ef-9498-c94fd49fd9a4" providerId="ADAL" clId="{C276C02F-050A-4F17-94C1-E5D14F895005}" dt="2022-02-22T13:20:29.726" v="3190"/>
+      <pc:sldChg chg="modSp add">
+        <pc:chgData name="Christopher Smith" userId="dd7fc2d5-9988-40ef-9498-c94fd49fd9a4" providerId="ADAL" clId="{C276C02F-050A-4F17-94C1-E5D14F895005}" dt="2022-02-22T13:03:07.937" v="2352" actId="20577"/>
         <pc:sldMkLst>
           <pc:docMk/>
           <pc:sldMk cId="279129629" sldId="262"/>
@@ -360,8 +360,8 @@
           </ac:spMkLst>
         </pc:spChg>
       </pc:sldChg>
-      <pc:sldChg chg="modSp add modAnim">
-        <pc:chgData name="Christopher Smith" userId="dd7fc2d5-9988-40ef-9498-c94fd49fd9a4" providerId="ADAL" clId="{C276C02F-050A-4F17-94C1-E5D14F895005}" dt="2022-02-22T13:20:36.153" v="3193"/>
+      <pc:sldChg chg="modSp add">
+        <pc:chgData name="Christopher Smith" userId="dd7fc2d5-9988-40ef-9498-c94fd49fd9a4" providerId="ADAL" clId="{C276C02F-050A-4F17-94C1-E5D14F895005}" dt="2022-02-22T13:05:42.049" v="2921" actId="20577"/>
         <pc:sldMkLst>
           <pc:docMk/>
           <pc:sldMk cId="689825584" sldId="263"/>
@@ -397,8 +397,8 @@
           <pc:sldMk cId="3708131831" sldId="263"/>
         </pc:sldMkLst>
       </pc:sldChg>
-      <pc:sldChg chg="modSp add modAnim">
-        <pc:chgData name="Christopher Smith" userId="dd7fc2d5-9988-40ef-9498-c94fd49fd9a4" providerId="ADAL" clId="{C276C02F-050A-4F17-94C1-E5D14F895005}" dt="2022-02-22T13:20:38.303" v="3194"/>
+      <pc:sldChg chg="modSp add">
+        <pc:chgData name="Christopher Smith" userId="dd7fc2d5-9988-40ef-9498-c94fd49fd9a4" providerId="ADAL" clId="{C276C02F-050A-4F17-94C1-E5D14F895005}" dt="2022-02-22T13:09:39.622" v="3186" actId="400"/>
         <pc:sldMkLst>
           <pc:docMk/>
           <pc:sldMk cId="273950689" sldId="264"/>
@@ -3843,359 +3843,6 @@
   <p:clrMapOvr>
     <a:masterClrMapping/>
   </p:clrMapOvr>
-  <p:timing>
-    <p:tnLst>
-      <p:par>
-        <p:cTn id="1" dur="indefinite" restart="never" nodeType="tmRoot">
-          <p:childTnLst>
-            <p:seq concurrent="1" nextAc="seek">
-              <p:cTn id="2" dur="indefinite" nodeType="mainSeq">
-                <p:childTnLst>
-                  <p:par>
-                    <p:cTn id="3" fill="hold">
-                      <p:stCondLst>
-                        <p:cond delay="indefinite"/>
-                      </p:stCondLst>
-                      <p:childTnLst>
-                        <p:par>
-                          <p:cTn id="4" fill="hold">
-                            <p:stCondLst>
-                              <p:cond delay="0"/>
-                            </p:stCondLst>
-                            <p:childTnLst>
-                              <p:par>
-                                <p:cTn id="5" presetID="1" presetClass="entr" presetSubtype="0" fill="hold" grpId="0" nodeType="clickEffect">
-                                  <p:stCondLst>
-                                    <p:cond delay="0"/>
-                                  </p:stCondLst>
-                                  <p:childTnLst>
-                                    <p:set>
-                                      <p:cBhvr>
-                                        <p:cTn id="6" dur="1" fill="hold">
-                                          <p:stCondLst>
-                                            <p:cond delay="0"/>
-                                          </p:stCondLst>
-                                        </p:cTn>
-                                        <p:tgtEl>
-                                          <p:spTgt spid="3">
-                                            <p:txEl>
-                                              <p:pRg st="0" end="0"/>
-                                            </p:txEl>
-                                          </p:spTgt>
-                                        </p:tgtEl>
-                                        <p:attrNameLst>
-                                          <p:attrName>style.visibility</p:attrName>
-                                        </p:attrNameLst>
-                                      </p:cBhvr>
-                                      <p:to>
-                                        <p:strVal val="visible"/>
-                                      </p:to>
-                                    </p:set>
-                                  </p:childTnLst>
-                                </p:cTn>
-                              </p:par>
-                            </p:childTnLst>
-                          </p:cTn>
-                        </p:par>
-                      </p:childTnLst>
-                    </p:cTn>
-                  </p:par>
-                  <p:par>
-                    <p:cTn id="7" fill="hold">
-                      <p:stCondLst>
-                        <p:cond delay="indefinite"/>
-                      </p:stCondLst>
-                      <p:childTnLst>
-                        <p:par>
-                          <p:cTn id="8" fill="hold">
-                            <p:stCondLst>
-                              <p:cond delay="0"/>
-                            </p:stCondLst>
-                            <p:childTnLst>
-                              <p:par>
-                                <p:cTn id="9" presetID="1" presetClass="entr" presetSubtype="0" fill="hold" grpId="0" nodeType="clickEffect">
-                                  <p:stCondLst>
-                                    <p:cond delay="0"/>
-                                  </p:stCondLst>
-                                  <p:childTnLst>
-                                    <p:set>
-                                      <p:cBhvr>
-                                        <p:cTn id="10" dur="1" fill="hold">
-                                          <p:stCondLst>
-                                            <p:cond delay="0"/>
-                                          </p:stCondLst>
-                                        </p:cTn>
-                                        <p:tgtEl>
-                                          <p:spTgt spid="3">
-                                            <p:txEl>
-                                              <p:pRg st="1" end="1"/>
-                                            </p:txEl>
-                                          </p:spTgt>
-                                        </p:tgtEl>
-                                        <p:attrNameLst>
-                                          <p:attrName>style.visibility</p:attrName>
-                                        </p:attrNameLst>
-                                      </p:cBhvr>
-                                      <p:to>
-                                        <p:strVal val="visible"/>
-                                      </p:to>
-                                    </p:set>
-                                  </p:childTnLst>
-                                </p:cTn>
-                              </p:par>
-                              <p:par>
-                                <p:cTn id="11" presetID="1" presetClass="entr" presetSubtype="0" fill="hold" grpId="0" nodeType="withEffect">
-                                  <p:stCondLst>
-                                    <p:cond delay="0"/>
-                                  </p:stCondLst>
-                                  <p:childTnLst>
-                                    <p:set>
-                                      <p:cBhvr>
-                                        <p:cTn id="12" dur="1" fill="hold">
-                                          <p:stCondLst>
-                                            <p:cond delay="0"/>
-                                          </p:stCondLst>
-                                        </p:cTn>
-                                        <p:tgtEl>
-                                          <p:spTgt spid="3">
-                                            <p:txEl>
-                                              <p:pRg st="2" end="2"/>
-                                            </p:txEl>
-                                          </p:spTgt>
-                                        </p:tgtEl>
-                                        <p:attrNameLst>
-                                          <p:attrName>style.visibility</p:attrName>
-                                        </p:attrNameLst>
-                                      </p:cBhvr>
-                                      <p:to>
-                                        <p:strVal val="visible"/>
-                                      </p:to>
-                                    </p:set>
-                                  </p:childTnLst>
-                                </p:cTn>
-                              </p:par>
-                            </p:childTnLst>
-                          </p:cTn>
-                        </p:par>
-                      </p:childTnLst>
-                    </p:cTn>
-                  </p:par>
-                  <p:par>
-                    <p:cTn id="13" fill="hold">
-                      <p:stCondLst>
-                        <p:cond delay="indefinite"/>
-                      </p:stCondLst>
-                      <p:childTnLst>
-                        <p:par>
-                          <p:cTn id="14" fill="hold">
-                            <p:stCondLst>
-                              <p:cond delay="0"/>
-                            </p:stCondLst>
-                            <p:childTnLst>
-                              <p:par>
-                                <p:cTn id="15" presetID="1" presetClass="entr" presetSubtype="0" fill="hold" grpId="0" nodeType="clickEffect">
-                                  <p:stCondLst>
-                                    <p:cond delay="0"/>
-                                  </p:stCondLst>
-                                  <p:childTnLst>
-                                    <p:set>
-                                      <p:cBhvr>
-                                        <p:cTn id="16" dur="1" fill="hold">
-                                          <p:stCondLst>
-                                            <p:cond delay="0"/>
-                                          </p:stCondLst>
-                                        </p:cTn>
-                                        <p:tgtEl>
-                                          <p:spTgt spid="3">
-                                            <p:txEl>
-                                              <p:pRg st="3" end="3"/>
-                                            </p:txEl>
-                                          </p:spTgt>
-                                        </p:tgtEl>
-                                        <p:attrNameLst>
-                                          <p:attrName>style.visibility</p:attrName>
-                                        </p:attrNameLst>
-                                      </p:cBhvr>
-                                      <p:to>
-                                        <p:strVal val="visible"/>
-                                      </p:to>
-                                    </p:set>
-                                  </p:childTnLst>
-                                </p:cTn>
-                              </p:par>
-                              <p:par>
-                                <p:cTn id="17" presetID="1" presetClass="entr" presetSubtype="0" fill="hold" grpId="0" nodeType="withEffect">
-                                  <p:stCondLst>
-                                    <p:cond delay="0"/>
-                                  </p:stCondLst>
-                                  <p:childTnLst>
-                                    <p:set>
-                                      <p:cBhvr>
-                                        <p:cTn id="18" dur="1" fill="hold">
-                                          <p:stCondLst>
-                                            <p:cond delay="0"/>
-                                          </p:stCondLst>
-                                        </p:cTn>
-                                        <p:tgtEl>
-                                          <p:spTgt spid="3">
-                                            <p:txEl>
-                                              <p:pRg st="4" end="4"/>
-                                            </p:txEl>
-                                          </p:spTgt>
-                                        </p:tgtEl>
-                                        <p:attrNameLst>
-                                          <p:attrName>style.visibility</p:attrName>
-                                        </p:attrNameLst>
-                                      </p:cBhvr>
-                                      <p:to>
-                                        <p:strVal val="visible"/>
-                                      </p:to>
-                                    </p:set>
-                                  </p:childTnLst>
-                                </p:cTn>
-                              </p:par>
-                            </p:childTnLst>
-                          </p:cTn>
-                        </p:par>
-                      </p:childTnLst>
-                    </p:cTn>
-                  </p:par>
-                  <p:par>
-                    <p:cTn id="19" fill="hold">
-                      <p:stCondLst>
-                        <p:cond delay="indefinite"/>
-                      </p:stCondLst>
-                      <p:childTnLst>
-                        <p:par>
-                          <p:cTn id="20" fill="hold">
-                            <p:stCondLst>
-                              <p:cond delay="0"/>
-                            </p:stCondLst>
-                            <p:childTnLst>
-                              <p:par>
-                                <p:cTn id="21" presetID="1" presetClass="entr" presetSubtype="0" fill="hold" grpId="0" nodeType="clickEffect">
-                                  <p:stCondLst>
-                                    <p:cond delay="0"/>
-                                  </p:stCondLst>
-                                  <p:childTnLst>
-                                    <p:set>
-                                      <p:cBhvr>
-                                        <p:cTn id="22" dur="1" fill="hold">
-                                          <p:stCondLst>
-                                            <p:cond delay="0"/>
-                                          </p:stCondLst>
-                                        </p:cTn>
-                                        <p:tgtEl>
-                                          <p:spTgt spid="3">
-                                            <p:txEl>
-                                              <p:pRg st="5" end="5"/>
-                                            </p:txEl>
-                                          </p:spTgt>
-                                        </p:tgtEl>
-                                        <p:attrNameLst>
-                                          <p:attrName>style.visibility</p:attrName>
-                                        </p:attrNameLst>
-                                      </p:cBhvr>
-                                      <p:to>
-                                        <p:strVal val="visible"/>
-                                      </p:to>
-                                    </p:set>
-                                  </p:childTnLst>
-                                </p:cTn>
-                              </p:par>
-                              <p:par>
-                                <p:cTn id="23" presetID="1" presetClass="entr" presetSubtype="0" fill="hold" grpId="0" nodeType="withEffect">
-                                  <p:stCondLst>
-                                    <p:cond delay="0"/>
-                                  </p:stCondLst>
-                                  <p:childTnLst>
-                                    <p:set>
-                                      <p:cBhvr>
-                                        <p:cTn id="24" dur="1" fill="hold">
-                                          <p:stCondLst>
-                                            <p:cond delay="0"/>
-                                          </p:stCondLst>
-                                        </p:cTn>
-                                        <p:tgtEl>
-                                          <p:spTgt spid="3">
-                                            <p:txEl>
-                                              <p:pRg st="6" end="6"/>
-                                            </p:txEl>
-                                          </p:spTgt>
-                                        </p:tgtEl>
-                                        <p:attrNameLst>
-                                          <p:attrName>style.visibility</p:attrName>
-                                        </p:attrNameLst>
-                                      </p:cBhvr>
-                                      <p:to>
-                                        <p:strVal val="visible"/>
-                                      </p:to>
-                                    </p:set>
-                                  </p:childTnLst>
-                                </p:cTn>
-                              </p:par>
-                              <p:par>
-                                <p:cTn id="25" presetID="1" presetClass="entr" presetSubtype="0" fill="hold" grpId="0" nodeType="withEffect">
-                                  <p:stCondLst>
-                                    <p:cond delay="0"/>
-                                  </p:stCondLst>
-                                  <p:childTnLst>
-                                    <p:set>
-                                      <p:cBhvr>
-                                        <p:cTn id="26" dur="1" fill="hold">
-                                          <p:stCondLst>
-                                            <p:cond delay="0"/>
-                                          </p:stCondLst>
-                                        </p:cTn>
-                                        <p:tgtEl>
-                                          <p:spTgt spid="3">
-                                            <p:txEl>
-                                              <p:pRg st="7" end="7"/>
-                                            </p:txEl>
-                                          </p:spTgt>
-                                        </p:tgtEl>
-                                        <p:attrNameLst>
-                                          <p:attrName>style.visibility</p:attrName>
-                                        </p:attrNameLst>
-                                      </p:cBhvr>
-                                      <p:to>
-                                        <p:strVal val="visible"/>
-                                      </p:to>
-                                    </p:set>
-                                  </p:childTnLst>
-                                </p:cTn>
-                              </p:par>
-                            </p:childTnLst>
-                          </p:cTn>
-                        </p:par>
-                      </p:childTnLst>
-                    </p:cTn>
-                  </p:par>
-                </p:childTnLst>
-              </p:cTn>
-              <p:prevCondLst>
-                <p:cond evt="onPrev" delay="0">
-                  <p:tgtEl>
-                    <p:sldTgt/>
-                  </p:tgtEl>
-                </p:cond>
-              </p:prevCondLst>
-              <p:nextCondLst>
-                <p:cond evt="onNext" delay="0">
-                  <p:tgtEl>
-                    <p:sldTgt/>
-                  </p:tgtEl>
-                </p:cond>
-              </p:nextCondLst>
-            </p:seq>
-          </p:childTnLst>
-        </p:cTn>
-      </p:par>
-    </p:tnLst>
-    <p:bldLst>
-      <p:bldP spid="3" grpId="0" build="p"/>
-    </p:bldLst>
-  </p:timing>
 </p:sld>
 </file>
 
@@ -4314,297 +3961,6 @@
   <p:clrMapOvr>
     <a:masterClrMapping/>
   </p:clrMapOvr>
-  <p:timing>
-    <p:tnLst>
-      <p:par>
-        <p:cTn id="1" dur="indefinite" restart="never" nodeType="tmRoot">
-          <p:childTnLst>
-            <p:seq concurrent="1" nextAc="seek">
-              <p:cTn id="2" dur="indefinite" nodeType="mainSeq">
-                <p:childTnLst>
-                  <p:par>
-                    <p:cTn id="3" fill="hold">
-                      <p:stCondLst>
-                        <p:cond delay="indefinite"/>
-                      </p:stCondLst>
-                      <p:childTnLst>
-                        <p:par>
-                          <p:cTn id="4" fill="hold">
-                            <p:stCondLst>
-                              <p:cond delay="0"/>
-                            </p:stCondLst>
-                            <p:childTnLst>
-                              <p:par>
-                                <p:cTn id="5" presetID="1" presetClass="entr" presetSubtype="0" fill="hold" grpId="0" nodeType="clickEffect">
-                                  <p:stCondLst>
-                                    <p:cond delay="0"/>
-                                  </p:stCondLst>
-                                  <p:childTnLst>
-                                    <p:set>
-                                      <p:cBhvr>
-                                        <p:cTn id="6" dur="1" fill="hold">
-                                          <p:stCondLst>
-                                            <p:cond delay="0"/>
-                                          </p:stCondLst>
-                                        </p:cTn>
-                                        <p:tgtEl>
-                                          <p:spTgt spid="3">
-                                            <p:txEl>
-                                              <p:pRg st="0" end="0"/>
-                                            </p:txEl>
-                                          </p:spTgt>
-                                        </p:tgtEl>
-                                        <p:attrNameLst>
-                                          <p:attrName>style.visibility</p:attrName>
-                                        </p:attrNameLst>
-                                      </p:cBhvr>
-                                      <p:to>
-                                        <p:strVal val="visible"/>
-                                      </p:to>
-                                    </p:set>
-                                  </p:childTnLst>
-                                </p:cTn>
-                              </p:par>
-                            </p:childTnLst>
-                          </p:cTn>
-                        </p:par>
-                      </p:childTnLst>
-                    </p:cTn>
-                  </p:par>
-                  <p:par>
-                    <p:cTn id="7" fill="hold">
-                      <p:stCondLst>
-                        <p:cond delay="indefinite"/>
-                      </p:stCondLst>
-                      <p:childTnLst>
-                        <p:par>
-                          <p:cTn id="8" fill="hold">
-                            <p:stCondLst>
-                              <p:cond delay="0"/>
-                            </p:stCondLst>
-                            <p:childTnLst>
-                              <p:par>
-                                <p:cTn id="9" presetID="1" presetClass="entr" presetSubtype="0" fill="hold" grpId="0" nodeType="clickEffect">
-                                  <p:stCondLst>
-                                    <p:cond delay="0"/>
-                                  </p:stCondLst>
-                                  <p:childTnLst>
-                                    <p:set>
-                                      <p:cBhvr>
-                                        <p:cTn id="10" dur="1" fill="hold">
-                                          <p:stCondLst>
-                                            <p:cond delay="0"/>
-                                          </p:stCondLst>
-                                        </p:cTn>
-                                        <p:tgtEl>
-                                          <p:spTgt spid="3">
-                                            <p:txEl>
-                                              <p:pRg st="1" end="1"/>
-                                            </p:txEl>
-                                          </p:spTgt>
-                                        </p:tgtEl>
-                                        <p:attrNameLst>
-                                          <p:attrName>style.visibility</p:attrName>
-                                        </p:attrNameLst>
-                                      </p:cBhvr>
-                                      <p:to>
-                                        <p:strVal val="visible"/>
-                                      </p:to>
-                                    </p:set>
-                                  </p:childTnLst>
-                                </p:cTn>
-                              </p:par>
-                            </p:childTnLst>
-                          </p:cTn>
-                        </p:par>
-                      </p:childTnLst>
-                    </p:cTn>
-                  </p:par>
-                  <p:par>
-                    <p:cTn id="11" fill="hold">
-                      <p:stCondLst>
-                        <p:cond delay="indefinite"/>
-                      </p:stCondLst>
-                      <p:childTnLst>
-                        <p:par>
-                          <p:cTn id="12" fill="hold">
-                            <p:stCondLst>
-                              <p:cond delay="0"/>
-                            </p:stCondLst>
-                            <p:childTnLst>
-                              <p:par>
-                                <p:cTn id="13" presetID="1" presetClass="entr" presetSubtype="0" fill="hold" grpId="0" nodeType="clickEffect">
-                                  <p:stCondLst>
-                                    <p:cond delay="0"/>
-                                  </p:stCondLst>
-                                  <p:childTnLst>
-                                    <p:set>
-                                      <p:cBhvr>
-                                        <p:cTn id="14" dur="1" fill="hold">
-                                          <p:stCondLst>
-                                            <p:cond delay="0"/>
-                                          </p:stCondLst>
-                                        </p:cTn>
-                                        <p:tgtEl>
-                                          <p:spTgt spid="3">
-                                            <p:txEl>
-                                              <p:pRg st="2" end="2"/>
-                                            </p:txEl>
-                                          </p:spTgt>
-                                        </p:tgtEl>
-                                        <p:attrNameLst>
-                                          <p:attrName>style.visibility</p:attrName>
-                                        </p:attrNameLst>
-                                      </p:cBhvr>
-                                      <p:to>
-                                        <p:strVal val="visible"/>
-                                      </p:to>
-                                    </p:set>
-                                  </p:childTnLst>
-                                </p:cTn>
-                              </p:par>
-                            </p:childTnLst>
-                          </p:cTn>
-                        </p:par>
-                      </p:childTnLst>
-                    </p:cTn>
-                  </p:par>
-                  <p:par>
-                    <p:cTn id="15" fill="hold">
-                      <p:stCondLst>
-                        <p:cond delay="indefinite"/>
-                      </p:stCondLst>
-                      <p:childTnLst>
-                        <p:par>
-                          <p:cTn id="16" fill="hold">
-                            <p:stCondLst>
-                              <p:cond delay="0"/>
-                            </p:stCondLst>
-                            <p:childTnLst>
-                              <p:par>
-                                <p:cTn id="17" presetID="1" presetClass="entr" presetSubtype="0" fill="hold" grpId="0" nodeType="clickEffect">
-                                  <p:stCondLst>
-                                    <p:cond delay="0"/>
-                                  </p:stCondLst>
-                                  <p:childTnLst>
-                                    <p:set>
-                                      <p:cBhvr>
-                                        <p:cTn id="18" dur="1" fill="hold">
-                                          <p:stCondLst>
-                                            <p:cond delay="0"/>
-                                          </p:stCondLst>
-                                        </p:cTn>
-                                        <p:tgtEl>
-                                          <p:spTgt spid="3">
-                                            <p:txEl>
-                                              <p:pRg st="3" end="3"/>
-                                            </p:txEl>
-                                          </p:spTgt>
-                                        </p:tgtEl>
-                                        <p:attrNameLst>
-                                          <p:attrName>style.visibility</p:attrName>
-                                        </p:attrNameLst>
-                                      </p:cBhvr>
-                                      <p:to>
-                                        <p:strVal val="visible"/>
-                                      </p:to>
-                                    </p:set>
-                                  </p:childTnLst>
-                                </p:cTn>
-                              </p:par>
-                              <p:par>
-                                <p:cTn id="19" presetID="1" presetClass="entr" presetSubtype="0" fill="hold" grpId="0" nodeType="withEffect">
-                                  <p:stCondLst>
-                                    <p:cond delay="0"/>
-                                  </p:stCondLst>
-                                  <p:childTnLst>
-                                    <p:set>
-                                      <p:cBhvr>
-                                        <p:cTn id="20" dur="1" fill="hold">
-                                          <p:stCondLst>
-                                            <p:cond delay="0"/>
-                                          </p:stCondLst>
-                                        </p:cTn>
-                                        <p:tgtEl>
-                                          <p:spTgt spid="3">
-                                            <p:txEl>
-                                              <p:pRg st="4" end="4"/>
-                                            </p:txEl>
-                                          </p:spTgt>
-                                        </p:tgtEl>
-                                        <p:attrNameLst>
-                                          <p:attrName>style.visibility</p:attrName>
-                                        </p:attrNameLst>
-                                      </p:cBhvr>
-                                      <p:to>
-                                        <p:strVal val="visible"/>
-                                      </p:to>
-                                    </p:set>
-                                  </p:childTnLst>
-                                </p:cTn>
-                              </p:par>
-                              <p:par>
-                                <p:cTn id="21" presetID="1" presetClass="entr" presetSubtype="0" fill="hold" grpId="0" nodeType="withEffect">
-                                  <p:stCondLst>
-                                    <p:cond delay="0"/>
-                                  </p:stCondLst>
-                                  <p:childTnLst>
-                                    <p:set>
-                                      <p:cBhvr>
-                                        <p:cTn id="22" dur="1" fill="hold">
-                                          <p:stCondLst>
-                                            <p:cond delay="0"/>
-                                          </p:stCondLst>
-                                        </p:cTn>
-                                        <p:tgtEl>
-                                          <p:spTgt spid="3">
-                                            <p:txEl>
-                                              <p:pRg st="5" end="5"/>
-                                            </p:txEl>
-                                          </p:spTgt>
-                                        </p:tgtEl>
-                                        <p:attrNameLst>
-                                          <p:attrName>style.visibility</p:attrName>
-                                        </p:attrNameLst>
-                                      </p:cBhvr>
-                                      <p:to>
-                                        <p:strVal val="visible"/>
-                                      </p:to>
-                                    </p:set>
-                                  </p:childTnLst>
-                                </p:cTn>
-                              </p:par>
-                            </p:childTnLst>
-                          </p:cTn>
-                        </p:par>
-                      </p:childTnLst>
-                    </p:cTn>
-                  </p:par>
-                </p:childTnLst>
-              </p:cTn>
-              <p:prevCondLst>
-                <p:cond evt="onPrev" delay="0">
-                  <p:tgtEl>
-                    <p:sldTgt/>
-                  </p:tgtEl>
-                </p:cond>
-              </p:prevCondLst>
-              <p:nextCondLst>
-                <p:cond evt="onNext" delay="0">
-                  <p:tgtEl>
-                    <p:sldTgt/>
-                  </p:tgtEl>
-                </p:cond>
-              </p:nextCondLst>
-            </p:seq>
-          </p:childTnLst>
-        </p:cTn>
-      </p:par>
-    </p:tnLst>
-    <p:bldLst>
-      <p:bldP spid="3" grpId="0" build="p"/>
-    </p:bldLst>
-  </p:timing>
 </p:sld>
 </file>
 
@@ -4701,137 +4057,6 @@
   <p:clrMapOvr>
     <a:masterClrMapping/>
   </p:clrMapOvr>
-  <p:timing>
-    <p:tnLst>
-      <p:par>
-        <p:cTn id="1" dur="indefinite" restart="never" nodeType="tmRoot">
-          <p:childTnLst>
-            <p:seq concurrent="1" nextAc="seek">
-              <p:cTn id="2" dur="indefinite" nodeType="mainSeq">
-                <p:childTnLst>
-                  <p:par>
-                    <p:cTn id="3" fill="hold">
-                      <p:stCondLst>
-                        <p:cond delay="indefinite"/>
-                      </p:stCondLst>
-                      <p:childTnLst>
-                        <p:par>
-                          <p:cTn id="4" fill="hold">
-                            <p:stCondLst>
-                              <p:cond delay="0"/>
-                            </p:stCondLst>
-                            <p:childTnLst>
-                              <p:par>
-                                <p:cTn id="5" presetID="1" presetClass="entr" presetSubtype="0" fill="hold" grpId="0" nodeType="clickEffect">
-                                  <p:stCondLst>
-                                    <p:cond delay="0"/>
-                                  </p:stCondLst>
-                                  <p:childTnLst>
-                                    <p:set>
-                                      <p:cBhvr>
-                                        <p:cTn id="6" dur="1" fill="hold">
-                                          <p:stCondLst>
-                                            <p:cond delay="0"/>
-                                          </p:stCondLst>
-                                        </p:cTn>
-                                        <p:tgtEl>
-                                          <p:spTgt spid="3">
-                                            <p:txEl>
-                                              <p:pRg st="0" end="0"/>
-                                            </p:txEl>
-                                          </p:spTgt>
-                                        </p:tgtEl>
-                                        <p:attrNameLst>
-                                          <p:attrName>style.visibility</p:attrName>
-                                        </p:attrNameLst>
-                                      </p:cBhvr>
-                                      <p:to>
-                                        <p:strVal val="visible"/>
-                                      </p:to>
-                                    </p:set>
-                                  </p:childTnLst>
-                                </p:cTn>
-                              </p:par>
-                            </p:childTnLst>
-                          </p:cTn>
-                        </p:par>
-                      </p:childTnLst>
-                    </p:cTn>
-                  </p:par>
-                  <p:par>
-                    <p:cTn id="7" fill="hold">
-                      <p:stCondLst>
-                        <p:cond delay="indefinite"/>
-                      </p:stCondLst>
-                      <p:childTnLst>
-                        <p:par>
-                          <p:cTn id="8" fill="hold">
-                            <p:stCondLst>
-                              <p:cond delay="0"/>
-                            </p:stCondLst>
-                            <p:childTnLst>
-                              <p:par>
-                                <p:cTn id="9" presetID="1" presetClass="entr" presetSubtype="0" fill="hold" grpId="0" nodeType="clickEffect">
-                                  <p:stCondLst>
-                                    <p:cond delay="0"/>
-                                  </p:stCondLst>
-                                  <p:childTnLst>
-                                    <p:set>
-                                      <p:cBhvr>
-                                        <p:cTn id="10" dur="1" fill="hold">
-                                          <p:stCondLst>
-                                            <p:cond delay="0"/>
-                                          </p:stCondLst>
-                                        </p:cTn>
-                                        <p:tgtEl>
-                                          <p:spTgt spid="3">
-                                            <p:txEl>
-                                              <p:pRg st="1" end="1"/>
-                                            </p:txEl>
-                                          </p:spTgt>
-                                        </p:tgtEl>
-                                        <p:attrNameLst>
-                                          <p:attrName>style.visibility</p:attrName>
-                                        </p:attrNameLst>
-                                      </p:cBhvr>
-                                      <p:to>
-                                        <p:strVal val="visible"/>
-                                      </p:to>
-                                    </p:set>
-                                  </p:childTnLst>
-                                </p:cTn>
-                              </p:par>
-                            </p:childTnLst>
-                          </p:cTn>
-                        </p:par>
-                      </p:childTnLst>
-                    </p:cTn>
-                  </p:par>
-                </p:childTnLst>
-              </p:cTn>
-              <p:prevCondLst>
-                <p:cond evt="onPrev" delay="0">
-                  <p:tgtEl>
-                    <p:sldTgt/>
-                  </p:tgtEl>
-                </p:cond>
-              </p:prevCondLst>
-              <p:nextCondLst>
-                <p:cond evt="onNext" delay="0">
-                  <p:tgtEl>
-                    <p:sldTgt/>
-                  </p:tgtEl>
-                </p:cond>
-              </p:nextCondLst>
-            </p:seq>
-          </p:childTnLst>
-        </p:cTn>
-      </p:par>
-    </p:tnLst>
-    <p:bldLst>
-      <p:bldP spid="3" grpId="0" build="p"/>
-    </p:bldLst>
-  </p:timing>
 </p:sld>
 </file>
 
@@ -4951,279 +4176,6 @@
   <p:clrMapOvr>
     <a:masterClrMapping/>
   </p:clrMapOvr>
-  <p:timing>
-    <p:tnLst>
-      <p:par>
-        <p:cTn id="1" dur="indefinite" restart="never" nodeType="tmRoot">
-          <p:childTnLst>
-            <p:seq concurrent="1" nextAc="seek">
-              <p:cTn id="2" dur="indefinite" nodeType="mainSeq">
-                <p:childTnLst>
-                  <p:par>
-                    <p:cTn id="3" fill="hold">
-                      <p:stCondLst>
-                        <p:cond delay="indefinite"/>
-                      </p:stCondLst>
-                      <p:childTnLst>
-                        <p:par>
-                          <p:cTn id="4" fill="hold">
-                            <p:stCondLst>
-                              <p:cond delay="0"/>
-                            </p:stCondLst>
-                            <p:childTnLst>
-                              <p:par>
-                                <p:cTn id="5" presetID="1" presetClass="entr" presetSubtype="0" fill="hold" grpId="0" nodeType="clickEffect">
-                                  <p:stCondLst>
-                                    <p:cond delay="0"/>
-                                  </p:stCondLst>
-                                  <p:childTnLst>
-                                    <p:set>
-                                      <p:cBhvr>
-                                        <p:cTn id="6" dur="1" fill="hold">
-                                          <p:stCondLst>
-                                            <p:cond delay="0"/>
-                                          </p:stCondLst>
-                                        </p:cTn>
-                                        <p:tgtEl>
-                                          <p:spTgt spid="3">
-                                            <p:txEl>
-                                              <p:pRg st="0" end="0"/>
-                                            </p:txEl>
-                                          </p:spTgt>
-                                        </p:tgtEl>
-                                        <p:attrNameLst>
-                                          <p:attrName>style.visibility</p:attrName>
-                                        </p:attrNameLst>
-                                      </p:cBhvr>
-                                      <p:to>
-                                        <p:strVal val="visible"/>
-                                      </p:to>
-                                    </p:set>
-                                  </p:childTnLst>
-                                </p:cTn>
-                              </p:par>
-                              <p:par>
-                                <p:cTn id="7" presetID="1" presetClass="entr" presetSubtype="0" fill="hold" grpId="0" nodeType="withEffect">
-                                  <p:stCondLst>
-                                    <p:cond delay="0"/>
-                                  </p:stCondLst>
-                                  <p:childTnLst>
-                                    <p:set>
-                                      <p:cBhvr>
-                                        <p:cTn id="8" dur="1" fill="hold">
-                                          <p:stCondLst>
-                                            <p:cond delay="0"/>
-                                          </p:stCondLst>
-                                        </p:cTn>
-                                        <p:tgtEl>
-                                          <p:spTgt spid="3">
-                                            <p:txEl>
-                                              <p:pRg st="1" end="1"/>
-                                            </p:txEl>
-                                          </p:spTgt>
-                                        </p:tgtEl>
-                                        <p:attrNameLst>
-                                          <p:attrName>style.visibility</p:attrName>
-                                        </p:attrNameLst>
-                                      </p:cBhvr>
-                                      <p:to>
-                                        <p:strVal val="visible"/>
-                                      </p:to>
-                                    </p:set>
-                                  </p:childTnLst>
-                                </p:cTn>
-                              </p:par>
-                              <p:par>
-                                <p:cTn id="9" presetID="1" presetClass="entr" presetSubtype="0" fill="hold" grpId="0" nodeType="withEffect">
-                                  <p:stCondLst>
-                                    <p:cond delay="0"/>
-                                  </p:stCondLst>
-                                  <p:childTnLst>
-                                    <p:set>
-                                      <p:cBhvr>
-                                        <p:cTn id="10" dur="1" fill="hold">
-                                          <p:stCondLst>
-                                            <p:cond delay="0"/>
-                                          </p:stCondLst>
-                                        </p:cTn>
-                                        <p:tgtEl>
-                                          <p:spTgt spid="3">
-                                            <p:txEl>
-                                              <p:pRg st="2" end="2"/>
-                                            </p:txEl>
-                                          </p:spTgt>
-                                        </p:tgtEl>
-                                        <p:attrNameLst>
-                                          <p:attrName>style.visibility</p:attrName>
-                                        </p:attrNameLst>
-                                      </p:cBhvr>
-                                      <p:to>
-                                        <p:strVal val="visible"/>
-                                      </p:to>
-                                    </p:set>
-                                  </p:childTnLst>
-                                </p:cTn>
-                              </p:par>
-                              <p:par>
-                                <p:cTn id="11" presetID="1" presetClass="entr" presetSubtype="0" fill="hold" grpId="0" nodeType="withEffect">
-                                  <p:stCondLst>
-                                    <p:cond delay="0"/>
-                                  </p:stCondLst>
-                                  <p:childTnLst>
-                                    <p:set>
-                                      <p:cBhvr>
-                                        <p:cTn id="12" dur="1" fill="hold">
-                                          <p:stCondLst>
-                                            <p:cond delay="0"/>
-                                          </p:stCondLst>
-                                        </p:cTn>
-                                        <p:tgtEl>
-                                          <p:spTgt spid="3">
-                                            <p:txEl>
-                                              <p:pRg st="3" end="3"/>
-                                            </p:txEl>
-                                          </p:spTgt>
-                                        </p:tgtEl>
-                                        <p:attrNameLst>
-                                          <p:attrName>style.visibility</p:attrName>
-                                        </p:attrNameLst>
-                                      </p:cBhvr>
-                                      <p:to>
-                                        <p:strVal val="visible"/>
-                                      </p:to>
-                                    </p:set>
-                                  </p:childTnLst>
-                                </p:cTn>
-                              </p:par>
-                            </p:childTnLst>
-                          </p:cTn>
-                        </p:par>
-                      </p:childTnLst>
-                    </p:cTn>
-                  </p:par>
-                  <p:par>
-                    <p:cTn id="13" fill="hold">
-                      <p:stCondLst>
-                        <p:cond delay="indefinite"/>
-                      </p:stCondLst>
-                      <p:childTnLst>
-                        <p:par>
-                          <p:cTn id="14" fill="hold">
-                            <p:stCondLst>
-                              <p:cond delay="0"/>
-                            </p:stCondLst>
-                            <p:childTnLst>
-                              <p:par>
-                                <p:cTn id="15" presetID="1" presetClass="entr" presetSubtype="0" fill="hold" grpId="0" nodeType="clickEffect">
-                                  <p:stCondLst>
-                                    <p:cond delay="0"/>
-                                  </p:stCondLst>
-                                  <p:childTnLst>
-                                    <p:set>
-                                      <p:cBhvr>
-                                        <p:cTn id="16" dur="1" fill="hold">
-                                          <p:stCondLst>
-                                            <p:cond delay="0"/>
-                                          </p:stCondLst>
-                                        </p:cTn>
-                                        <p:tgtEl>
-                                          <p:spTgt spid="3">
-                                            <p:txEl>
-                                              <p:pRg st="4" end="4"/>
-                                            </p:txEl>
-                                          </p:spTgt>
-                                        </p:tgtEl>
-                                        <p:attrNameLst>
-                                          <p:attrName>style.visibility</p:attrName>
-                                        </p:attrNameLst>
-                                      </p:cBhvr>
-                                      <p:to>
-                                        <p:strVal val="visible"/>
-                                      </p:to>
-                                    </p:set>
-                                  </p:childTnLst>
-                                </p:cTn>
-                              </p:par>
-                            </p:childTnLst>
-                          </p:cTn>
-                        </p:par>
-                      </p:childTnLst>
-                    </p:cTn>
-                  </p:par>
-                  <p:par>
-                    <p:cTn id="17" fill="hold">
-                      <p:stCondLst>
-                        <p:cond delay="indefinite"/>
-                      </p:stCondLst>
-                      <p:childTnLst>
-                        <p:par>
-                          <p:cTn id="18" fill="hold">
-                            <p:stCondLst>
-                              <p:cond delay="0"/>
-                            </p:stCondLst>
-                            <p:childTnLst>
-                              <p:par>
-                                <p:cTn id="19" presetID="1" presetClass="entr" presetSubtype="0" fill="hold" grpId="0" nodeType="clickEffect">
-                                  <p:stCondLst>
-                                    <p:cond delay="0"/>
-                                  </p:stCondLst>
-                                  <p:childTnLst>
-                                    <p:set>
-                                      <p:cBhvr>
-                                        <p:cTn id="20" dur="1" fill="hold">
-                                          <p:stCondLst>
-                                            <p:cond delay="0"/>
-                                          </p:stCondLst>
-                                        </p:cTn>
-                                        <p:tgtEl>
-                                          <p:spTgt spid="3">
-                                            <p:txEl>
-                                              <p:pRg st="5" end="5"/>
-                                            </p:txEl>
-                                          </p:spTgt>
-                                        </p:tgtEl>
-                                        <p:attrNameLst>
-                                          <p:attrName>style.visibility</p:attrName>
-                                        </p:attrNameLst>
-                                      </p:cBhvr>
-                                      <p:to>
-                                        <p:strVal val="visible"/>
-                                      </p:to>
-                                    </p:set>
-                                  </p:childTnLst>
-                                </p:cTn>
-                              </p:par>
-                            </p:childTnLst>
-                          </p:cTn>
-                        </p:par>
-                      </p:childTnLst>
-                    </p:cTn>
-                  </p:par>
-                </p:childTnLst>
-              </p:cTn>
-              <p:prevCondLst>
-                <p:cond evt="onPrev" delay="0">
-                  <p:tgtEl>
-                    <p:sldTgt/>
-                  </p:tgtEl>
-                </p:cond>
-              </p:prevCondLst>
-              <p:nextCondLst>
-                <p:cond evt="onNext" delay="0">
-                  <p:tgtEl>
-                    <p:sldTgt/>
-                  </p:tgtEl>
-                </p:cond>
-              </p:nextCondLst>
-            </p:seq>
-          </p:childTnLst>
-        </p:cTn>
-      </p:par>
-    </p:tnLst>
-    <p:bldLst>
-      <p:bldP spid="3" grpId="0" build="p"/>
-    </p:bldLst>
-  </p:timing>
 </p:sld>
 </file>
 
@@ -5398,434 +4350,6 @@
   <p:clrMapOvr>
     <a:masterClrMapping/>
   </p:clrMapOvr>
-  <p:timing>
-    <p:tnLst>
-      <p:par>
-        <p:cTn id="1" dur="indefinite" restart="never" nodeType="tmRoot">
-          <p:childTnLst>
-            <p:seq concurrent="1" nextAc="seek">
-              <p:cTn id="2" dur="indefinite" nodeType="mainSeq">
-                <p:childTnLst>
-                  <p:par>
-                    <p:cTn id="3" fill="hold">
-                      <p:stCondLst>
-                        <p:cond delay="indefinite"/>
-                      </p:stCondLst>
-                      <p:childTnLst>
-                        <p:par>
-                          <p:cTn id="4" fill="hold">
-                            <p:stCondLst>
-                              <p:cond delay="0"/>
-                            </p:stCondLst>
-                            <p:childTnLst>
-                              <p:par>
-                                <p:cTn id="5" presetID="1" presetClass="entr" presetSubtype="0" fill="hold" grpId="0" nodeType="clickEffect">
-                                  <p:stCondLst>
-                                    <p:cond delay="0"/>
-                                  </p:stCondLst>
-                                  <p:childTnLst>
-                                    <p:set>
-                                      <p:cBhvr>
-                                        <p:cTn id="6" dur="1" fill="hold">
-                                          <p:stCondLst>
-                                            <p:cond delay="0"/>
-                                          </p:stCondLst>
-                                        </p:cTn>
-                                        <p:tgtEl>
-                                          <p:spTgt spid="3">
-                                            <p:txEl>
-                                              <p:pRg st="0" end="0"/>
-                                            </p:txEl>
-                                          </p:spTgt>
-                                        </p:tgtEl>
-                                        <p:attrNameLst>
-                                          <p:attrName>style.visibility</p:attrName>
-                                        </p:attrNameLst>
-                                      </p:cBhvr>
-                                      <p:to>
-                                        <p:strVal val="visible"/>
-                                      </p:to>
-                                    </p:set>
-                                  </p:childTnLst>
-                                </p:cTn>
-                              </p:par>
-                              <p:par>
-                                <p:cTn id="7" presetID="1" presetClass="entr" presetSubtype="0" fill="hold" grpId="0" nodeType="withEffect">
-                                  <p:stCondLst>
-                                    <p:cond delay="0"/>
-                                  </p:stCondLst>
-                                  <p:childTnLst>
-                                    <p:set>
-                                      <p:cBhvr>
-                                        <p:cTn id="8" dur="1" fill="hold">
-                                          <p:stCondLst>
-                                            <p:cond delay="0"/>
-                                          </p:stCondLst>
-                                        </p:cTn>
-                                        <p:tgtEl>
-                                          <p:spTgt spid="3">
-                                            <p:txEl>
-                                              <p:pRg st="1" end="1"/>
-                                            </p:txEl>
-                                          </p:spTgt>
-                                        </p:tgtEl>
-                                        <p:attrNameLst>
-                                          <p:attrName>style.visibility</p:attrName>
-                                        </p:attrNameLst>
-                                      </p:cBhvr>
-                                      <p:to>
-                                        <p:strVal val="visible"/>
-                                      </p:to>
-                                    </p:set>
-                                  </p:childTnLst>
-                                </p:cTn>
-                              </p:par>
-                              <p:par>
-                                <p:cTn id="9" presetID="1" presetClass="entr" presetSubtype="0" fill="hold" grpId="0" nodeType="withEffect">
-                                  <p:stCondLst>
-                                    <p:cond delay="0"/>
-                                  </p:stCondLst>
-                                  <p:childTnLst>
-                                    <p:set>
-                                      <p:cBhvr>
-                                        <p:cTn id="10" dur="1" fill="hold">
-                                          <p:stCondLst>
-                                            <p:cond delay="0"/>
-                                          </p:stCondLst>
-                                        </p:cTn>
-                                        <p:tgtEl>
-                                          <p:spTgt spid="3">
-                                            <p:txEl>
-                                              <p:pRg st="2" end="2"/>
-                                            </p:txEl>
-                                          </p:spTgt>
-                                        </p:tgtEl>
-                                        <p:attrNameLst>
-                                          <p:attrName>style.visibility</p:attrName>
-                                        </p:attrNameLst>
-                                      </p:cBhvr>
-                                      <p:to>
-                                        <p:strVal val="visible"/>
-                                      </p:to>
-                                    </p:set>
-                                  </p:childTnLst>
-                                </p:cTn>
-                              </p:par>
-                              <p:par>
-                                <p:cTn id="11" presetID="1" presetClass="entr" presetSubtype="0" fill="hold" grpId="0" nodeType="withEffect">
-                                  <p:stCondLst>
-                                    <p:cond delay="0"/>
-                                  </p:stCondLst>
-                                  <p:childTnLst>
-                                    <p:set>
-                                      <p:cBhvr>
-                                        <p:cTn id="12" dur="1" fill="hold">
-                                          <p:stCondLst>
-                                            <p:cond delay="0"/>
-                                          </p:stCondLst>
-                                        </p:cTn>
-                                        <p:tgtEl>
-                                          <p:spTgt spid="3">
-                                            <p:txEl>
-                                              <p:pRg st="3" end="3"/>
-                                            </p:txEl>
-                                          </p:spTgt>
-                                        </p:tgtEl>
-                                        <p:attrNameLst>
-                                          <p:attrName>style.visibility</p:attrName>
-                                        </p:attrNameLst>
-                                      </p:cBhvr>
-                                      <p:to>
-                                        <p:strVal val="visible"/>
-                                      </p:to>
-                                    </p:set>
-                                  </p:childTnLst>
-                                </p:cTn>
-                              </p:par>
-                            </p:childTnLst>
-                          </p:cTn>
-                        </p:par>
-                      </p:childTnLst>
-                    </p:cTn>
-                  </p:par>
-                  <p:par>
-                    <p:cTn id="13" fill="hold">
-                      <p:stCondLst>
-                        <p:cond delay="indefinite"/>
-                      </p:stCondLst>
-                      <p:childTnLst>
-                        <p:par>
-                          <p:cTn id="14" fill="hold">
-                            <p:stCondLst>
-                              <p:cond delay="0"/>
-                            </p:stCondLst>
-                            <p:childTnLst>
-                              <p:par>
-                                <p:cTn id="15" presetID="1" presetClass="entr" presetSubtype="0" fill="hold" grpId="0" nodeType="clickEffect">
-                                  <p:stCondLst>
-                                    <p:cond delay="0"/>
-                                  </p:stCondLst>
-                                  <p:childTnLst>
-                                    <p:set>
-                                      <p:cBhvr>
-                                        <p:cTn id="16" dur="1" fill="hold">
-                                          <p:stCondLst>
-                                            <p:cond delay="0"/>
-                                          </p:stCondLst>
-                                        </p:cTn>
-                                        <p:tgtEl>
-                                          <p:spTgt spid="3">
-                                            <p:txEl>
-                                              <p:pRg st="4" end="4"/>
-                                            </p:txEl>
-                                          </p:spTgt>
-                                        </p:tgtEl>
-                                        <p:attrNameLst>
-                                          <p:attrName>style.visibility</p:attrName>
-                                        </p:attrNameLst>
-                                      </p:cBhvr>
-                                      <p:to>
-                                        <p:strVal val="visible"/>
-                                      </p:to>
-                                    </p:set>
-                                  </p:childTnLst>
-                                </p:cTn>
-                              </p:par>
-                              <p:par>
-                                <p:cTn id="17" presetID="1" presetClass="entr" presetSubtype="0" fill="hold" grpId="0" nodeType="withEffect">
-                                  <p:stCondLst>
-                                    <p:cond delay="0"/>
-                                  </p:stCondLst>
-                                  <p:childTnLst>
-                                    <p:set>
-                                      <p:cBhvr>
-                                        <p:cTn id="18" dur="1" fill="hold">
-                                          <p:stCondLst>
-                                            <p:cond delay="0"/>
-                                          </p:stCondLst>
-                                        </p:cTn>
-                                        <p:tgtEl>
-                                          <p:spTgt spid="3">
-                                            <p:txEl>
-                                              <p:pRg st="5" end="5"/>
-                                            </p:txEl>
-                                          </p:spTgt>
-                                        </p:tgtEl>
-                                        <p:attrNameLst>
-                                          <p:attrName>style.visibility</p:attrName>
-                                        </p:attrNameLst>
-                                      </p:cBhvr>
-                                      <p:to>
-                                        <p:strVal val="visible"/>
-                                      </p:to>
-                                    </p:set>
-                                  </p:childTnLst>
-                                </p:cTn>
-                              </p:par>
-                              <p:par>
-                                <p:cTn id="19" presetID="1" presetClass="entr" presetSubtype="0" fill="hold" grpId="0" nodeType="withEffect">
-                                  <p:stCondLst>
-                                    <p:cond delay="0"/>
-                                  </p:stCondLst>
-                                  <p:childTnLst>
-                                    <p:set>
-                                      <p:cBhvr>
-                                        <p:cTn id="20" dur="1" fill="hold">
-                                          <p:stCondLst>
-                                            <p:cond delay="0"/>
-                                          </p:stCondLst>
-                                        </p:cTn>
-                                        <p:tgtEl>
-                                          <p:spTgt spid="3">
-                                            <p:txEl>
-                                              <p:pRg st="6" end="6"/>
-                                            </p:txEl>
-                                          </p:spTgt>
-                                        </p:tgtEl>
-                                        <p:attrNameLst>
-                                          <p:attrName>style.visibility</p:attrName>
-                                        </p:attrNameLst>
-                                      </p:cBhvr>
-                                      <p:to>
-                                        <p:strVal val="visible"/>
-                                      </p:to>
-                                    </p:set>
-                                  </p:childTnLst>
-                                </p:cTn>
-                              </p:par>
-                              <p:par>
-                                <p:cTn id="21" presetID="1" presetClass="entr" presetSubtype="0" fill="hold" grpId="0" nodeType="withEffect">
-                                  <p:stCondLst>
-                                    <p:cond delay="0"/>
-                                  </p:stCondLst>
-                                  <p:childTnLst>
-                                    <p:set>
-                                      <p:cBhvr>
-                                        <p:cTn id="22" dur="1" fill="hold">
-                                          <p:stCondLst>
-                                            <p:cond delay="0"/>
-                                          </p:stCondLst>
-                                        </p:cTn>
-                                        <p:tgtEl>
-                                          <p:spTgt spid="3">
-                                            <p:txEl>
-                                              <p:pRg st="7" end="7"/>
-                                            </p:txEl>
-                                          </p:spTgt>
-                                        </p:tgtEl>
-                                        <p:attrNameLst>
-                                          <p:attrName>style.visibility</p:attrName>
-                                        </p:attrNameLst>
-                                      </p:cBhvr>
-                                      <p:to>
-                                        <p:strVal val="visible"/>
-                                      </p:to>
-                                    </p:set>
-                                  </p:childTnLst>
-                                </p:cTn>
-                              </p:par>
-                              <p:par>
-                                <p:cTn id="23" presetID="1" presetClass="entr" presetSubtype="0" fill="hold" grpId="0" nodeType="withEffect">
-                                  <p:stCondLst>
-                                    <p:cond delay="0"/>
-                                  </p:stCondLst>
-                                  <p:childTnLst>
-                                    <p:set>
-                                      <p:cBhvr>
-                                        <p:cTn id="24" dur="1" fill="hold">
-                                          <p:stCondLst>
-                                            <p:cond delay="0"/>
-                                          </p:stCondLst>
-                                        </p:cTn>
-                                        <p:tgtEl>
-                                          <p:spTgt spid="3">
-                                            <p:txEl>
-                                              <p:pRg st="8" end="8"/>
-                                            </p:txEl>
-                                          </p:spTgt>
-                                        </p:tgtEl>
-                                        <p:attrNameLst>
-                                          <p:attrName>style.visibility</p:attrName>
-                                        </p:attrNameLst>
-                                      </p:cBhvr>
-                                      <p:to>
-                                        <p:strVal val="visible"/>
-                                      </p:to>
-                                    </p:set>
-                                  </p:childTnLst>
-                                </p:cTn>
-                              </p:par>
-                              <p:par>
-                                <p:cTn id="25" presetID="1" presetClass="entr" presetSubtype="0" fill="hold" grpId="0" nodeType="withEffect">
-                                  <p:stCondLst>
-                                    <p:cond delay="0"/>
-                                  </p:stCondLst>
-                                  <p:childTnLst>
-                                    <p:set>
-                                      <p:cBhvr>
-                                        <p:cTn id="26" dur="1" fill="hold">
-                                          <p:stCondLst>
-                                            <p:cond delay="0"/>
-                                          </p:stCondLst>
-                                        </p:cTn>
-                                        <p:tgtEl>
-                                          <p:spTgt spid="3">
-                                            <p:txEl>
-                                              <p:pRg st="9" end="9"/>
-                                            </p:txEl>
-                                          </p:spTgt>
-                                        </p:tgtEl>
-                                        <p:attrNameLst>
-                                          <p:attrName>style.visibility</p:attrName>
-                                        </p:attrNameLst>
-                                      </p:cBhvr>
-                                      <p:to>
-                                        <p:strVal val="visible"/>
-                                      </p:to>
-                                    </p:set>
-                                  </p:childTnLst>
-                                </p:cTn>
-                              </p:par>
-                            </p:childTnLst>
-                          </p:cTn>
-                        </p:par>
-                      </p:childTnLst>
-                    </p:cTn>
-                  </p:par>
-                  <p:par>
-                    <p:cTn id="27" fill="hold">
-                      <p:stCondLst>
-                        <p:cond delay="indefinite"/>
-                      </p:stCondLst>
-                      <p:childTnLst>
-                        <p:par>
-                          <p:cTn id="28" fill="hold">
-                            <p:stCondLst>
-                              <p:cond delay="0"/>
-                            </p:stCondLst>
-                            <p:childTnLst>
-                              <p:par>
-                                <p:cTn id="29" presetID="1" presetClass="entr" presetSubtype="0" fill="hold" grpId="0" nodeType="clickEffect">
-                                  <p:stCondLst>
-                                    <p:cond delay="0"/>
-                                  </p:stCondLst>
-                                  <p:childTnLst>
-                                    <p:set>
-                                      <p:cBhvr>
-                                        <p:cTn id="30" dur="1" fill="hold">
-                                          <p:stCondLst>
-                                            <p:cond delay="0"/>
-                                          </p:stCondLst>
-                                        </p:cTn>
-                                        <p:tgtEl>
-                                          <p:spTgt spid="3">
-                                            <p:txEl>
-                                              <p:pRg st="10" end="10"/>
-                                            </p:txEl>
-                                          </p:spTgt>
-                                        </p:tgtEl>
-                                        <p:attrNameLst>
-                                          <p:attrName>style.visibility</p:attrName>
-                                        </p:attrNameLst>
-                                      </p:cBhvr>
-                                      <p:to>
-                                        <p:strVal val="visible"/>
-                                      </p:to>
-                                    </p:set>
-                                  </p:childTnLst>
-                                </p:cTn>
-                              </p:par>
-                            </p:childTnLst>
-                          </p:cTn>
-                        </p:par>
-                      </p:childTnLst>
-                    </p:cTn>
-                  </p:par>
-                </p:childTnLst>
-              </p:cTn>
-              <p:prevCondLst>
-                <p:cond evt="onPrev" delay="0">
-                  <p:tgtEl>
-                    <p:sldTgt/>
-                  </p:tgtEl>
-                </p:cond>
-              </p:prevCondLst>
-              <p:nextCondLst>
-                <p:cond evt="onNext" delay="0">
-                  <p:tgtEl>
-                    <p:sldTgt/>
-                  </p:tgtEl>
-                </p:cond>
-              </p:nextCondLst>
-            </p:seq>
-          </p:childTnLst>
-        </p:cTn>
-      </p:par>
-    </p:tnLst>
-    <p:bldLst>
-      <p:bldP spid="3" grpId="0" build="p"/>
-    </p:bldLst>
-  </p:timing>
 </p:sld>
 </file>
 
@@ -5926,186 +4450,6 @@
   <p:clrMapOvr>
     <a:masterClrMapping/>
   </p:clrMapOvr>
-  <p:timing>
-    <p:tnLst>
-      <p:par>
-        <p:cTn id="1" dur="indefinite" restart="never" nodeType="tmRoot">
-          <p:childTnLst>
-            <p:seq concurrent="1" nextAc="seek">
-              <p:cTn id="2" dur="indefinite" nodeType="mainSeq">
-                <p:childTnLst>
-                  <p:par>
-                    <p:cTn id="3" fill="hold">
-                      <p:stCondLst>
-                        <p:cond delay="indefinite"/>
-                      </p:stCondLst>
-                      <p:childTnLst>
-                        <p:par>
-                          <p:cTn id="4" fill="hold">
-                            <p:stCondLst>
-                              <p:cond delay="0"/>
-                            </p:stCondLst>
-                            <p:childTnLst>
-                              <p:par>
-                                <p:cTn id="5" presetID="1" presetClass="entr" presetSubtype="0" fill="hold" grpId="0" nodeType="clickEffect">
-                                  <p:stCondLst>
-                                    <p:cond delay="0"/>
-                                  </p:stCondLst>
-                                  <p:childTnLst>
-                                    <p:set>
-                                      <p:cBhvr>
-                                        <p:cTn id="6" dur="1" fill="hold">
-                                          <p:stCondLst>
-                                            <p:cond delay="0"/>
-                                          </p:stCondLst>
-                                        </p:cTn>
-                                        <p:tgtEl>
-                                          <p:spTgt spid="3">
-                                            <p:txEl>
-                                              <p:pRg st="0" end="0"/>
-                                            </p:txEl>
-                                          </p:spTgt>
-                                        </p:tgtEl>
-                                        <p:attrNameLst>
-                                          <p:attrName>style.visibility</p:attrName>
-                                        </p:attrNameLst>
-                                      </p:cBhvr>
-                                      <p:to>
-                                        <p:strVal val="visible"/>
-                                      </p:to>
-                                    </p:set>
-                                  </p:childTnLst>
-                                </p:cTn>
-                              </p:par>
-                            </p:childTnLst>
-                          </p:cTn>
-                        </p:par>
-                      </p:childTnLst>
-                    </p:cTn>
-                  </p:par>
-                  <p:par>
-                    <p:cTn id="7" fill="hold">
-                      <p:stCondLst>
-                        <p:cond delay="indefinite"/>
-                      </p:stCondLst>
-                      <p:childTnLst>
-                        <p:par>
-                          <p:cTn id="8" fill="hold">
-                            <p:stCondLst>
-                              <p:cond delay="0"/>
-                            </p:stCondLst>
-                            <p:childTnLst>
-                              <p:par>
-                                <p:cTn id="9" presetID="1" presetClass="entr" presetSubtype="0" fill="hold" grpId="0" nodeType="clickEffect">
-                                  <p:stCondLst>
-                                    <p:cond delay="0"/>
-                                  </p:stCondLst>
-                                  <p:childTnLst>
-                                    <p:set>
-                                      <p:cBhvr>
-                                        <p:cTn id="10" dur="1" fill="hold">
-                                          <p:stCondLst>
-                                            <p:cond delay="0"/>
-                                          </p:stCondLst>
-                                        </p:cTn>
-                                        <p:tgtEl>
-                                          <p:spTgt spid="3">
-                                            <p:txEl>
-                                              <p:pRg st="1" end="1"/>
-                                            </p:txEl>
-                                          </p:spTgt>
-                                        </p:tgtEl>
-                                        <p:attrNameLst>
-                                          <p:attrName>style.visibility</p:attrName>
-                                        </p:attrNameLst>
-                                      </p:cBhvr>
-                                      <p:to>
-                                        <p:strVal val="visible"/>
-                                      </p:to>
-                                    </p:set>
-                                  </p:childTnLst>
-                                </p:cTn>
-                              </p:par>
-                            </p:childTnLst>
-                          </p:cTn>
-                        </p:par>
-                      </p:childTnLst>
-                    </p:cTn>
-                  </p:par>
-                  <p:par>
-                    <p:cTn id="11" fill="hold">
-                      <p:stCondLst>
-                        <p:cond delay="indefinite"/>
-                      </p:stCondLst>
-                      <p:childTnLst>
-                        <p:par>
-                          <p:cTn id="12" fill="hold">
-                            <p:stCondLst>
-                              <p:cond delay="0"/>
-                            </p:stCondLst>
-                            <p:childTnLst>
-                              <p:par>
-                                <p:cTn id="13" presetID="1" presetClass="entr" presetSubtype="0" fill="hold" grpId="0" nodeType="clickEffect">
-                                  <p:stCondLst>
-                                    <p:cond delay="0"/>
-                                  </p:stCondLst>
-                                  <p:childTnLst>
-                                    <p:set>
-                                      <p:cBhvr>
-                                        <p:cTn id="14" dur="1" fill="hold">
-                                          <p:stCondLst>
-                                            <p:cond delay="0"/>
-                                          </p:stCondLst>
-                                        </p:cTn>
-                                        <p:tgtEl>
-                                          <p:spTgt spid="3">
-                                            <p:txEl>
-                                              <p:pRg st="2" end="2"/>
-                                            </p:txEl>
-                                          </p:spTgt>
-                                        </p:tgtEl>
-                                        <p:attrNameLst>
-                                          <p:attrName>style.visibility</p:attrName>
-                                        </p:attrNameLst>
-                                      </p:cBhvr>
-                                      <p:to>
-                                        <p:strVal val="visible"/>
-                                      </p:to>
-                                    </p:set>
-                                  </p:childTnLst>
-                                </p:cTn>
-                              </p:par>
-                            </p:childTnLst>
-                          </p:cTn>
-                        </p:par>
-                      </p:childTnLst>
-                    </p:cTn>
-                  </p:par>
-                </p:childTnLst>
-              </p:cTn>
-              <p:prevCondLst>
-                <p:cond evt="onPrev" delay="0">
-                  <p:tgtEl>
-                    <p:sldTgt/>
-                  </p:tgtEl>
-                </p:cond>
-              </p:prevCondLst>
-              <p:nextCondLst>
-                <p:cond evt="onNext" delay="0">
-                  <p:tgtEl>
-                    <p:sldTgt/>
-                  </p:tgtEl>
-                </p:cond>
-              </p:nextCondLst>
-            </p:seq>
-          </p:childTnLst>
-        </p:cTn>
-      </p:par>
-    </p:tnLst>
-    <p:bldLst>
-      <p:bldP spid="3" grpId="0" build="p"/>
-    </p:bldLst>
-  </p:timing>
 </p:sld>
 </file>
 
@@ -6225,279 +4569,6 @@
   <p:clrMapOvr>
     <a:masterClrMapping/>
   </p:clrMapOvr>
-  <p:timing>
-    <p:tnLst>
-      <p:par>
-        <p:cTn id="1" dur="indefinite" restart="never" nodeType="tmRoot">
-          <p:childTnLst>
-            <p:seq concurrent="1" nextAc="seek">
-              <p:cTn id="2" dur="indefinite" nodeType="mainSeq">
-                <p:childTnLst>
-                  <p:par>
-                    <p:cTn id="3" fill="hold">
-                      <p:stCondLst>
-                        <p:cond delay="indefinite"/>
-                      </p:stCondLst>
-                      <p:childTnLst>
-                        <p:par>
-                          <p:cTn id="4" fill="hold">
-                            <p:stCondLst>
-                              <p:cond delay="0"/>
-                            </p:stCondLst>
-                            <p:childTnLst>
-                              <p:par>
-                                <p:cTn id="5" presetID="1" presetClass="entr" presetSubtype="0" fill="hold" grpId="0" nodeType="clickEffect">
-                                  <p:stCondLst>
-                                    <p:cond delay="0"/>
-                                  </p:stCondLst>
-                                  <p:childTnLst>
-                                    <p:set>
-                                      <p:cBhvr>
-                                        <p:cTn id="6" dur="1" fill="hold">
-                                          <p:stCondLst>
-                                            <p:cond delay="0"/>
-                                          </p:stCondLst>
-                                        </p:cTn>
-                                        <p:tgtEl>
-                                          <p:spTgt spid="3">
-                                            <p:txEl>
-                                              <p:pRg st="0" end="0"/>
-                                            </p:txEl>
-                                          </p:spTgt>
-                                        </p:tgtEl>
-                                        <p:attrNameLst>
-                                          <p:attrName>style.visibility</p:attrName>
-                                        </p:attrNameLst>
-                                      </p:cBhvr>
-                                      <p:to>
-                                        <p:strVal val="visible"/>
-                                      </p:to>
-                                    </p:set>
-                                  </p:childTnLst>
-                                </p:cTn>
-                              </p:par>
-                            </p:childTnLst>
-                          </p:cTn>
-                        </p:par>
-                      </p:childTnLst>
-                    </p:cTn>
-                  </p:par>
-                  <p:par>
-                    <p:cTn id="7" fill="hold">
-                      <p:stCondLst>
-                        <p:cond delay="indefinite"/>
-                      </p:stCondLst>
-                      <p:childTnLst>
-                        <p:par>
-                          <p:cTn id="8" fill="hold">
-                            <p:stCondLst>
-                              <p:cond delay="0"/>
-                            </p:stCondLst>
-                            <p:childTnLst>
-                              <p:par>
-                                <p:cTn id="9" presetID="1" presetClass="entr" presetSubtype="0" fill="hold" grpId="0" nodeType="clickEffect">
-                                  <p:stCondLst>
-                                    <p:cond delay="0"/>
-                                  </p:stCondLst>
-                                  <p:childTnLst>
-                                    <p:set>
-                                      <p:cBhvr>
-                                        <p:cTn id="10" dur="1" fill="hold">
-                                          <p:stCondLst>
-                                            <p:cond delay="0"/>
-                                          </p:stCondLst>
-                                        </p:cTn>
-                                        <p:tgtEl>
-                                          <p:spTgt spid="3">
-                                            <p:txEl>
-                                              <p:pRg st="1" end="1"/>
-                                            </p:txEl>
-                                          </p:spTgt>
-                                        </p:tgtEl>
-                                        <p:attrNameLst>
-                                          <p:attrName>style.visibility</p:attrName>
-                                        </p:attrNameLst>
-                                      </p:cBhvr>
-                                      <p:to>
-                                        <p:strVal val="visible"/>
-                                      </p:to>
-                                    </p:set>
-                                  </p:childTnLst>
-                                </p:cTn>
-                              </p:par>
-                              <p:par>
-                                <p:cTn id="11" presetID="1" presetClass="entr" presetSubtype="0" fill="hold" grpId="0" nodeType="withEffect">
-                                  <p:stCondLst>
-                                    <p:cond delay="0"/>
-                                  </p:stCondLst>
-                                  <p:childTnLst>
-                                    <p:set>
-                                      <p:cBhvr>
-                                        <p:cTn id="12" dur="1" fill="hold">
-                                          <p:stCondLst>
-                                            <p:cond delay="0"/>
-                                          </p:stCondLst>
-                                        </p:cTn>
-                                        <p:tgtEl>
-                                          <p:spTgt spid="3">
-                                            <p:txEl>
-                                              <p:pRg st="2" end="2"/>
-                                            </p:txEl>
-                                          </p:spTgt>
-                                        </p:tgtEl>
-                                        <p:attrNameLst>
-                                          <p:attrName>style.visibility</p:attrName>
-                                        </p:attrNameLst>
-                                      </p:cBhvr>
-                                      <p:to>
-                                        <p:strVal val="visible"/>
-                                      </p:to>
-                                    </p:set>
-                                  </p:childTnLst>
-                                </p:cTn>
-                              </p:par>
-                              <p:par>
-                                <p:cTn id="13" presetID="1" presetClass="entr" presetSubtype="0" fill="hold" grpId="0" nodeType="withEffect">
-                                  <p:stCondLst>
-                                    <p:cond delay="0"/>
-                                  </p:stCondLst>
-                                  <p:childTnLst>
-                                    <p:set>
-                                      <p:cBhvr>
-                                        <p:cTn id="14" dur="1" fill="hold">
-                                          <p:stCondLst>
-                                            <p:cond delay="0"/>
-                                          </p:stCondLst>
-                                        </p:cTn>
-                                        <p:tgtEl>
-                                          <p:spTgt spid="3">
-                                            <p:txEl>
-                                              <p:pRg st="3" end="3"/>
-                                            </p:txEl>
-                                          </p:spTgt>
-                                        </p:tgtEl>
-                                        <p:attrNameLst>
-                                          <p:attrName>style.visibility</p:attrName>
-                                        </p:attrNameLst>
-                                      </p:cBhvr>
-                                      <p:to>
-                                        <p:strVal val="visible"/>
-                                      </p:to>
-                                    </p:set>
-                                  </p:childTnLst>
-                                </p:cTn>
-                              </p:par>
-                              <p:par>
-                                <p:cTn id="15" presetID="1" presetClass="entr" presetSubtype="0" fill="hold" grpId="0" nodeType="withEffect">
-                                  <p:stCondLst>
-                                    <p:cond delay="0"/>
-                                  </p:stCondLst>
-                                  <p:childTnLst>
-                                    <p:set>
-                                      <p:cBhvr>
-                                        <p:cTn id="16" dur="1" fill="hold">
-                                          <p:stCondLst>
-                                            <p:cond delay="0"/>
-                                          </p:stCondLst>
-                                        </p:cTn>
-                                        <p:tgtEl>
-                                          <p:spTgt spid="3">
-                                            <p:txEl>
-                                              <p:pRg st="4" end="4"/>
-                                            </p:txEl>
-                                          </p:spTgt>
-                                        </p:tgtEl>
-                                        <p:attrNameLst>
-                                          <p:attrName>style.visibility</p:attrName>
-                                        </p:attrNameLst>
-                                      </p:cBhvr>
-                                      <p:to>
-                                        <p:strVal val="visible"/>
-                                      </p:to>
-                                    </p:set>
-                                  </p:childTnLst>
-                                </p:cTn>
-                              </p:par>
-                            </p:childTnLst>
-                          </p:cTn>
-                        </p:par>
-                      </p:childTnLst>
-                    </p:cTn>
-                  </p:par>
-                  <p:par>
-                    <p:cTn id="17" fill="hold">
-                      <p:stCondLst>
-                        <p:cond delay="indefinite"/>
-                      </p:stCondLst>
-                      <p:childTnLst>
-                        <p:par>
-                          <p:cTn id="18" fill="hold">
-                            <p:stCondLst>
-                              <p:cond delay="0"/>
-                            </p:stCondLst>
-                            <p:childTnLst>
-                              <p:par>
-                                <p:cTn id="19" presetID="1" presetClass="entr" presetSubtype="0" fill="hold" grpId="0" nodeType="clickEffect">
-                                  <p:stCondLst>
-                                    <p:cond delay="0"/>
-                                  </p:stCondLst>
-                                  <p:childTnLst>
-                                    <p:set>
-                                      <p:cBhvr>
-                                        <p:cTn id="20" dur="1" fill="hold">
-                                          <p:stCondLst>
-                                            <p:cond delay="0"/>
-                                          </p:stCondLst>
-                                        </p:cTn>
-                                        <p:tgtEl>
-                                          <p:spTgt spid="3">
-                                            <p:txEl>
-                                              <p:pRg st="5" end="5"/>
-                                            </p:txEl>
-                                          </p:spTgt>
-                                        </p:tgtEl>
-                                        <p:attrNameLst>
-                                          <p:attrName>style.visibility</p:attrName>
-                                        </p:attrNameLst>
-                                      </p:cBhvr>
-                                      <p:to>
-                                        <p:strVal val="visible"/>
-                                      </p:to>
-                                    </p:set>
-                                  </p:childTnLst>
-                                </p:cTn>
-                              </p:par>
-                            </p:childTnLst>
-                          </p:cTn>
-                        </p:par>
-                      </p:childTnLst>
-                    </p:cTn>
-                  </p:par>
-                </p:childTnLst>
-              </p:cTn>
-              <p:prevCondLst>
-                <p:cond evt="onPrev" delay="0">
-                  <p:tgtEl>
-                    <p:sldTgt/>
-                  </p:tgtEl>
-                </p:cond>
-              </p:prevCondLst>
-              <p:nextCondLst>
-                <p:cond evt="onNext" delay="0">
-                  <p:tgtEl>
-                    <p:sldTgt/>
-                  </p:tgtEl>
-                </p:cond>
-              </p:nextCondLst>
-            </p:seq>
-          </p:childTnLst>
-        </p:cTn>
-      </p:par>
-    </p:tnLst>
-    <p:bldLst>
-      <p:bldP spid="3" grpId="0" build="p"/>
-    </p:bldLst>
-  </p:timing>
 </p:sld>
 </file>
 
@@ -6626,248 +4697,6 @@
   <p:clrMapOvr>
     <a:masterClrMapping/>
   </p:clrMapOvr>
-  <p:timing>
-    <p:tnLst>
-      <p:par>
-        <p:cTn id="1" dur="indefinite" restart="never" nodeType="tmRoot">
-          <p:childTnLst>
-            <p:seq concurrent="1" nextAc="seek">
-              <p:cTn id="2" dur="indefinite" nodeType="mainSeq">
-                <p:childTnLst>
-                  <p:par>
-                    <p:cTn id="3" fill="hold">
-                      <p:stCondLst>
-                        <p:cond delay="indefinite"/>
-                      </p:stCondLst>
-                      <p:childTnLst>
-                        <p:par>
-                          <p:cTn id="4" fill="hold">
-                            <p:stCondLst>
-                              <p:cond delay="0"/>
-                            </p:stCondLst>
-                            <p:childTnLst>
-                              <p:par>
-                                <p:cTn id="5" presetID="1" presetClass="entr" presetSubtype="0" fill="hold" grpId="0" nodeType="clickEffect">
-                                  <p:stCondLst>
-                                    <p:cond delay="0"/>
-                                  </p:stCondLst>
-                                  <p:childTnLst>
-                                    <p:set>
-                                      <p:cBhvr>
-                                        <p:cTn id="6" dur="1" fill="hold">
-                                          <p:stCondLst>
-                                            <p:cond delay="0"/>
-                                          </p:stCondLst>
-                                        </p:cTn>
-                                        <p:tgtEl>
-                                          <p:spTgt spid="3">
-                                            <p:txEl>
-                                              <p:pRg st="0" end="0"/>
-                                            </p:txEl>
-                                          </p:spTgt>
-                                        </p:tgtEl>
-                                        <p:attrNameLst>
-                                          <p:attrName>style.visibility</p:attrName>
-                                        </p:attrNameLst>
-                                      </p:cBhvr>
-                                      <p:to>
-                                        <p:strVal val="visible"/>
-                                      </p:to>
-                                    </p:set>
-                                  </p:childTnLst>
-                                </p:cTn>
-                              </p:par>
-                            </p:childTnLst>
-                          </p:cTn>
-                        </p:par>
-                      </p:childTnLst>
-                    </p:cTn>
-                  </p:par>
-                  <p:par>
-                    <p:cTn id="7" fill="hold">
-                      <p:stCondLst>
-                        <p:cond delay="indefinite"/>
-                      </p:stCondLst>
-                      <p:childTnLst>
-                        <p:par>
-                          <p:cTn id="8" fill="hold">
-                            <p:stCondLst>
-                              <p:cond delay="0"/>
-                            </p:stCondLst>
-                            <p:childTnLst>
-                              <p:par>
-                                <p:cTn id="9" presetID="1" presetClass="entr" presetSubtype="0" fill="hold" grpId="0" nodeType="clickEffect">
-                                  <p:stCondLst>
-                                    <p:cond delay="0"/>
-                                  </p:stCondLst>
-                                  <p:childTnLst>
-                                    <p:set>
-                                      <p:cBhvr>
-                                        <p:cTn id="10" dur="1" fill="hold">
-                                          <p:stCondLst>
-                                            <p:cond delay="0"/>
-                                          </p:stCondLst>
-                                        </p:cTn>
-                                        <p:tgtEl>
-                                          <p:spTgt spid="3">
-                                            <p:txEl>
-                                              <p:pRg st="1" end="1"/>
-                                            </p:txEl>
-                                          </p:spTgt>
-                                        </p:tgtEl>
-                                        <p:attrNameLst>
-                                          <p:attrName>style.visibility</p:attrName>
-                                        </p:attrNameLst>
-                                      </p:cBhvr>
-                                      <p:to>
-                                        <p:strVal val="visible"/>
-                                      </p:to>
-                                    </p:set>
-                                  </p:childTnLst>
-                                </p:cTn>
-                              </p:par>
-                            </p:childTnLst>
-                          </p:cTn>
-                        </p:par>
-                      </p:childTnLst>
-                    </p:cTn>
-                  </p:par>
-                  <p:par>
-                    <p:cTn id="11" fill="hold">
-                      <p:stCondLst>
-                        <p:cond delay="indefinite"/>
-                      </p:stCondLst>
-                      <p:childTnLst>
-                        <p:par>
-                          <p:cTn id="12" fill="hold">
-                            <p:stCondLst>
-                              <p:cond delay="0"/>
-                            </p:stCondLst>
-                            <p:childTnLst>
-                              <p:par>
-                                <p:cTn id="13" presetID="1" presetClass="entr" presetSubtype="0" fill="hold" grpId="0" nodeType="clickEffect">
-                                  <p:stCondLst>
-                                    <p:cond delay="0"/>
-                                  </p:stCondLst>
-                                  <p:childTnLst>
-                                    <p:set>
-                                      <p:cBhvr>
-                                        <p:cTn id="14" dur="1" fill="hold">
-                                          <p:stCondLst>
-                                            <p:cond delay="0"/>
-                                          </p:stCondLst>
-                                        </p:cTn>
-                                        <p:tgtEl>
-                                          <p:spTgt spid="3">
-                                            <p:txEl>
-                                              <p:pRg st="2" end="2"/>
-                                            </p:txEl>
-                                          </p:spTgt>
-                                        </p:tgtEl>
-                                        <p:attrNameLst>
-                                          <p:attrName>style.visibility</p:attrName>
-                                        </p:attrNameLst>
-                                      </p:cBhvr>
-                                      <p:to>
-                                        <p:strVal val="visible"/>
-                                      </p:to>
-                                    </p:set>
-                                  </p:childTnLst>
-                                </p:cTn>
-                              </p:par>
-                              <p:par>
-                                <p:cTn id="15" presetID="1" presetClass="entr" presetSubtype="0" fill="hold" grpId="0" nodeType="withEffect">
-                                  <p:stCondLst>
-                                    <p:cond delay="0"/>
-                                  </p:stCondLst>
-                                  <p:childTnLst>
-                                    <p:set>
-                                      <p:cBhvr>
-                                        <p:cTn id="16" dur="1" fill="hold">
-                                          <p:stCondLst>
-                                            <p:cond delay="0"/>
-                                          </p:stCondLst>
-                                        </p:cTn>
-                                        <p:tgtEl>
-                                          <p:spTgt spid="3">
-                                            <p:txEl>
-                                              <p:pRg st="3" end="3"/>
-                                            </p:txEl>
-                                          </p:spTgt>
-                                        </p:tgtEl>
-                                        <p:attrNameLst>
-                                          <p:attrName>style.visibility</p:attrName>
-                                        </p:attrNameLst>
-                                      </p:cBhvr>
-                                      <p:to>
-                                        <p:strVal val="visible"/>
-                                      </p:to>
-                                    </p:set>
-                                  </p:childTnLst>
-                                </p:cTn>
-                              </p:par>
-                              <p:par>
-                                <p:cTn id="17" presetID="1" presetClass="entr" presetSubtype="0" fill="hold" grpId="0" nodeType="withEffect">
-                                  <p:stCondLst>
-                                    <p:cond delay="0"/>
-                                  </p:stCondLst>
-                                  <p:childTnLst>
-                                    <p:set>
-                                      <p:cBhvr>
-                                        <p:cTn id="18" dur="1" fill="hold">
-                                          <p:stCondLst>
-                                            <p:cond delay="0"/>
-                                          </p:stCondLst>
-                                        </p:cTn>
-                                        <p:tgtEl>
-                                          <p:spTgt spid="3">
-                                            <p:txEl>
-                                              <p:pRg st="4" end="4"/>
-                                            </p:txEl>
-                                          </p:spTgt>
-                                        </p:tgtEl>
-                                        <p:attrNameLst>
-                                          <p:attrName>style.visibility</p:attrName>
-                                        </p:attrNameLst>
-                                      </p:cBhvr>
-                                      <p:to>
-                                        <p:strVal val="visible"/>
-                                      </p:to>
-                                    </p:set>
-                                  </p:childTnLst>
-                                </p:cTn>
-                              </p:par>
-                            </p:childTnLst>
-                          </p:cTn>
-                        </p:par>
-                      </p:childTnLst>
-                    </p:cTn>
-                  </p:par>
-                </p:childTnLst>
-              </p:cTn>
-              <p:prevCondLst>
-                <p:cond evt="onPrev" delay="0">
-                  <p:tgtEl>
-                    <p:sldTgt/>
-                  </p:tgtEl>
-                </p:cond>
-              </p:prevCondLst>
-              <p:nextCondLst>
-                <p:cond evt="onNext" delay="0">
-                  <p:tgtEl>
-                    <p:sldTgt/>
-                  </p:tgtEl>
-                </p:cond>
-              </p:nextCondLst>
-            </p:seq>
-          </p:childTnLst>
-        </p:cTn>
-      </p:par>
-    </p:tnLst>
-    <p:bldLst>
-      <p:bldP spid="3" grpId="0" build="p"/>
-    </p:bldLst>
-  </p:timing>
 </p:sld>
 </file>
 
@@ -7176,6 +5005,12 @@
 </file>
 
 <file path=customXml/item2.xml><?xml version="1.0" encoding="utf-8"?>
+<p:properties xmlns:p="http://schemas.microsoft.com/office/2006/metadata/properties" xmlns:xsi="http://www.w3.org/2001/XMLSchema-instance" xmlns:pc="http://schemas.microsoft.com/office/infopath/2007/PartnerControls">
+  <documentManagement/>
+</p:properties>
+</file>
+
+<file path=customXml/item3.xml><?xml version="1.0" encoding="utf-8"?>
 <ct:contentTypeSchema xmlns:ct="http://schemas.microsoft.com/office/2006/metadata/contentType" xmlns:ma="http://schemas.microsoft.com/office/2006/metadata/properties/metaAttributes" ct:_="" ma:_="" ma:contentTypeName="Document" ma:contentTypeID="0x010100ABA223F759147049B9D8A25DED07DD24" ma:contentTypeVersion="14" ma:contentTypeDescription="Create a new document." ma:contentTypeScope="" ma:versionID="754cccfe17833f4d06e0267dc9c12ab7">
   <xsd:schema xmlns:xsd="http://www.w3.org/2001/XMLSchema" xmlns:xs="http://www.w3.org/2001/XMLSchema" xmlns:p="http://schemas.microsoft.com/office/2006/metadata/properties" xmlns:ns3="cc9255bc-4d99-4f42-bba5-857cbcc6e725" xmlns:ns4="fc2bff61-6a31-4c51-9f32-b9bba46405e5" targetNamespace="http://schemas.microsoft.com/office/2006/metadata/properties" ma:root="true" ma:fieldsID="e32414dc8724dfdc561355c14801bc84" ns3:_="" ns4:_="">
     <xsd:import namespace="cc9255bc-4d99-4f42-bba5-857cbcc6e725"/>
@@ -7404,12 +5239,6 @@
 </ct:contentTypeSchema>
 </file>
 
-<file path=customXml/item3.xml><?xml version="1.0" encoding="utf-8"?>
-<p:properties xmlns:p="http://schemas.microsoft.com/office/2006/metadata/properties" xmlns:xsi="http://www.w3.org/2001/XMLSchema-instance" xmlns:pc="http://schemas.microsoft.com/office/infopath/2007/PartnerControls">
-  <documentManagement/>
-</p:properties>
-</file>
-
 <file path=customXml/itemProps1.xml><?xml version="1.0" encoding="utf-8"?>
 <ds:datastoreItem xmlns:ds="http://schemas.openxmlformats.org/officeDocument/2006/customXml" ds:itemID="{FFF71063-750A-4F15-A0E6-049A2BA10D5D}">
   <ds:schemaRefs>
@@ -7419,6 +5248,23 @@
 </file>
 
 <file path=customXml/itemProps2.xml><?xml version="1.0" encoding="utf-8"?>
+<ds:datastoreItem xmlns:ds="http://schemas.openxmlformats.org/officeDocument/2006/customXml" ds:itemID="{82A546FB-9270-4554-87AE-89FE30D805B0}">
+  <ds:schemaRefs>
+    <ds:schemaRef ds:uri="http://schemas.microsoft.com/office/2006/documentManagement/types"/>
+    <ds:schemaRef ds:uri="http://purl.org/dc/terms/"/>
+    <ds:schemaRef ds:uri="http://purl.org/dc/elements/1.1/"/>
+    <ds:schemaRef ds:uri="http://schemas.openxmlformats.org/package/2006/metadata/core-properties"/>
+    <ds:schemaRef ds:uri="http://schemas.microsoft.com/office/infopath/2007/PartnerControls"/>
+    <ds:schemaRef ds:uri="http://www.w3.org/XML/1998/namespace"/>
+    <ds:schemaRef ds:uri="fc2bff61-6a31-4c51-9f32-b9bba46405e5"/>
+    <ds:schemaRef ds:uri="cc9255bc-4d99-4f42-bba5-857cbcc6e725"/>
+    <ds:schemaRef ds:uri="http://schemas.microsoft.com/office/2006/metadata/properties"/>
+    <ds:schemaRef ds:uri="http://purl.org/dc/dcmitype/"/>
+  </ds:schemaRefs>
+</ds:datastoreItem>
+</file>
+
+<file path=customXml/itemProps3.xml><?xml version="1.0" encoding="utf-8"?>
 <ds:datastoreItem xmlns:ds="http://schemas.openxmlformats.org/officeDocument/2006/customXml" ds:itemID="{B2D82F21-8668-4A3F-A308-37FA558F9F37}">
   <ds:schemaRefs>
     <ds:schemaRef ds:uri="http://schemas.microsoft.com/office/2006/metadata/contentType"/>
@@ -7435,21 +5281,4 @@
     <ds:schemaRef ds:uri="http://schemas.microsoft.com/internal/obd"/>
   </ds:schemaRefs>
 </ds:datastoreItem>
-</file>
-
-<file path=customXml/itemProps3.xml><?xml version="1.0" encoding="utf-8"?>
-<ds:datastoreItem xmlns:ds="http://schemas.openxmlformats.org/officeDocument/2006/customXml" ds:itemID="{82A546FB-9270-4554-87AE-89FE30D805B0}">
-  <ds:schemaRefs>
-    <ds:schemaRef ds:uri="http://purl.org/dc/dcmitype/"/>
-    <ds:schemaRef ds:uri="http://www.w3.org/XML/1998/namespace"/>
-    <ds:schemaRef ds:uri="fc2bff61-6a31-4c51-9f32-b9bba46405e5"/>
-    <ds:schemaRef ds:uri="http://schemas.microsoft.com/office/infopath/2007/PartnerControls"/>
-    <ds:schemaRef ds:uri="http://schemas.microsoft.com/office/2006/documentManagement/types"/>
-    <ds:schemaRef ds:uri="http://purl.org/dc/terms/"/>
-    <ds:schemaRef ds:uri="http://purl.org/dc/elements/1.1/"/>
-    <ds:schemaRef ds:uri="http://schemas.openxmlformats.org/package/2006/metadata/core-properties"/>
-    <ds:schemaRef ds:uri="cc9255bc-4d99-4f42-bba5-857cbcc6e725"/>
-    <ds:schemaRef ds:uri="http://schemas.microsoft.com/office/2006/metadata/properties"/>
-  </ds:schemaRefs>
-</ds:datastoreItem>
 </file>
</xml_diff>